<commit_message>
day 1 of bootcamp
</commit_message>
<xml_diff>
--- a/Python_Complete.pptx
+++ b/Python_Complete.pptx
@@ -6336,13 +6336,18 @@
           <a:lstStyle/>
           <a:p>
             <a:r>
-              <a:rPr lang="en-US" sz="4000" dirty="0">
+              <a:rPr lang="en-US" sz="4000">
                 <a:solidFill>
                   <a:schemeClr val="accent4"/>
                 </a:solidFill>
               </a:rPr>
-              <a:t>Lists</a:t>
-            </a:r>
+              <a:t>Work</a:t>
+            </a:r>
+            <a:endParaRPr lang="en-US" sz="4000" dirty="0">
+              <a:solidFill>
+                <a:schemeClr val="accent4"/>
+              </a:solidFill>
+            </a:endParaRPr>
           </a:p>
         </p:txBody>
       </p:sp>

</xml_diff>